<commit_message>
fixed button size, added network button, added some buttons to window
</commit_message>
<xml_diff>
--- a/ImageResources/ProjectFiles/menu.pptx
+++ b/ImageResources/ProjectFiles/menu.pptx
@@ -26,6 +26,7 @@
     <p:sldId id="278" r:id="rId20"/>
     <p:sldId id="279" r:id="rId21"/>
     <p:sldId id="280" r:id="rId22"/>
+    <p:sldId id="284" r:id="rId23"/>
   </p:sldIdLst>
   <p:sldSz cx="9525000" cy="9525000"/>
   <p:notesSz cx="6858000" cy="9144000"/>
@@ -127,7 +128,7 @@
   <p:extLst>
     <p:ext uri="{EFAFB233-063F-42B5-8137-9DF3F51BA10A}">
       <p15:sldGuideLst xmlns:p15="http://schemas.microsoft.com/office/powerpoint/2012/main">
-        <p15:guide id="1" orient="horz" pos="2977" userDrawn="1">
+        <p15:guide id="1" orient="horz" pos="3000" userDrawn="1">
           <p15:clr>
             <a:srgbClr val="A4A3A4"/>
           </p15:clr>
@@ -144,7 +145,7 @@
 </file>
 
 <file path=ppt/slideLayouts/slideLayout1.xml><?xml version="1.0" encoding="utf-8"?>
-<p:sldLayout xmlns:a="http://schemas.openxmlformats.org/drawingml/2006/main" xmlns:r="http://schemas.openxmlformats.org/officeDocument/2006/relationships" xmlns:p="http://schemas.openxmlformats.org/presentationml/2006/main" type="title" preserve="1">
+<p:sldLayout xmlns:a="http://schemas.openxmlformats.org/drawingml/2006/main" xmlns:r="http://schemas.openxmlformats.org/officeDocument/2006/relationships" xmlns:p="http://schemas.openxmlformats.org/presentationml/2006/main" showMasterSp="0" type="title" preserve="1">
   <p:cSld name="Titelfolie">
     <p:spTree>
       <p:nvGrpSpPr>
@@ -368,7 +369,7 @@
 </file>
 
 <file path=ppt/slideLayouts/slideLayout10.xml><?xml version="1.0" encoding="utf-8"?>
-<p:sldLayout xmlns:a="http://schemas.openxmlformats.org/drawingml/2006/main" xmlns:r="http://schemas.openxmlformats.org/officeDocument/2006/relationships" xmlns:p="http://schemas.openxmlformats.org/presentationml/2006/main" type="vertTx" preserve="1">
+<p:sldLayout xmlns:a="http://schemas.openxmlformats.org/drawingml/2006/main" xmlns:r="http://schemas.openxmlformats.org/officeDocument/2006/relationships" xmlns:p="http://schemas.openxmlformats.org/presentationml/2006/main" showMasterSp="0" type="vertTx" preserve="1">
   <p:cSld name="Titel und vertikaler Text">
     <p:spTree>
       <p:nvGrpSpPr>
@@ -570,7 +571,7 @@
 </file>
 
 <file path=ppt/slideLayouts/slideLayout11.xml><?xml version="1.0" encoding="utf-8"?>
-<p:sldLayout xmlns:a="http://schemas.openxmlformats.org/drawingml/2006/main" xmlns:r="http://schemas.openxmlformats.org/officeDocument/2006/relationships" xmlns:p="http://schemas.openxmlformats.org/presentationml/2006/main" type="vertTitleAndTx" preserve="1">
+<p:sldLayout xmlns:a="http://schemas.openxmlformats.org/drawingml/2006/main" xmlns:r="http://schemas.openxmlformats.org/officeDocument/2006/relationships" xmlns:p="http://schemas.openxmlformats.org/presentationml/2006/main" showMasterSp="0" type="vertTitleAndTx" preserve="1">
   <p:cSld name="Vertikaler Titel und Text">
     <p:spTree>
       <p:nvGrpSpPr>
@@ -782,7 +783,7 @@
 </file>
 
 <file path=ppt/slideLayouts/slideLayout2.xml><?xml version="1.0" encoding="utf-8"?>
-<p:sldLayout xmlns:a="http://schemas.openxmlformats.org/drawingml/2006/main" xmlns:r="http://schemas.openxmlformats.org/officeDocument/2006/relationships" xmlns:p="http://schemas.openxmlformats.org/presentationml/2006/main" type="obj" preserve="1">
+<p:sldLayout xmlns:a="http://schemas.openxmlformats.org/drawingml/2006/main" xmlns:r="http://schemas.openxmlformats.org/officeDocument/2006/relationships" xmlns:p="http://schemas.openxmlformats.org/presentationml/2006/main" showMasterSp="0" type="obj" preserve="1">
   <p:cSld name="Titel und Inhalt">
     <p:spTree>
       <p:nvGrpSpPr>
@@ -984,7 +985,7 @@
 </file>
 
 <file path=ppt/slideLayouts/slideLayout3.xml><?xml version="1.0" encoding="utf-8"?>
-<p:sldLayout xmlns:a="http://schemas.openxmlformats.org/drawingml/2006/main" xmlns:r="http://schemas.openxmlformats.org/officeDocument/2006/relationships" xmlns:p="http://schemas.openxmlformats.org/presentationml/2006/main" type="secHead" preserve="1">
+<p:sldLayout xmlns:a="http://schemas.openxmlformats.org/drawingml/2006/main" xmlns:r="http://schemas.openxmlformats.org/officeDocument/2006/relationships" xmlns:p="http://schemas.openxmlformats.org/presentationml/2006/main" showMasterSp="0" type="secHead" preserve="1">
   <p:cSld name="Abschnitts-&#10;überschrift">
     <p:spTree>
       <p:nvGrpSpPr>
@@ -1260,7 +1261,7 @@
 </file>
 
 <file path=ppt/slideLayouts/slideLayout4.xml><?xml version="1.0" encoding="utf-8"?>
-<p:sldLayout xmlns:a="http://schemas.openxmlformats.org/drawingml/2006/main" xmlns:r="http://schemas.openxmlformats.org/officeDocument/2006/relationships" xmlns:p="http://schemas.openxmlformats.org/presentationml/2006/main" type="twoObj" preserve="1">
+<p:sldLayout xmlns:a="http://schemas.openxmlformats.org/drawingml/2006/main" xmlns:r="http://schemas.openxmlformats.org/officeDocument/2006/relationships" xmlns:p="http://schemas.openxmlformats.org/presentationml/2006/main" showMasterSp="0" type="twoObj" preserve="1">
   <p:cSld name="Zwei Inhalte">
     <p:spTree>
       <p:nvGrpSpPr>
@@ -1524,7 +1525,7 @@
 </file>
 
 <file path=ppt/slideLayouts/slideLayout5.xml><?xml version="1.0" encoding="utf-8"?>
-<p:sldLayout xmlns:a="http://schemas.openxmlformats.org/drawingml/2006/main" xmlns:r="http://schemas.openxmlformats.org/officeDocument/2006/relationships" xmlns:p="http://schemas.openxmlformats.org/presentationml/2006/main" type="twoTxTwoObj" preserve="1">
+<p:sldLayout xmlns:a="http://schemas.openxmlformats.org/drawingml/2006/main" xmlns:r="http://schemas.openxmlformats.org/officeDocument/2006/relationships" xmlns:p="http://schemas.openxmlformats.org/presentationml/2006/main" showMasterSp="0" type="twoTxTwoObj" preserve="1">
   <p:cSld name="Vergleich">
     <p:spTree>
       <p:nvGrpSpPr>
@@ -1923,7 +1924,7 @@
 </file>
 
 <file path=ppt/slideLayouts/slideLayout6.xml><?xml version="1.0" encoding="utf-8"?>
-<p:sldLayout xmlns:a="http://schemas.openxmlformats.org/drawingml/2006/main" xmlns:r="http://schemas.openxmlformats.org/officeDocument/2006/relationships" xmlns:p="http://schemas.openxmlformats.org/presentationml/2006/main" type="titleOnly" preserve="1">
+<p:sldLayout xmlns:a="http://schemas.openxmlformats.org/drawingml/2006/main" xmlns:r="http://schemas.openxmlformats.org/officeDocument/2006/relationships" xmlns:p="http://schemas.openxmlformats.org/presentationml/2006/main" showMasterSp="0" type="titleOnly" preserve="1">
   <p:cSld name="Nur Titel">
     <p:spTree>
       <p:nvGrpSpPr>
@@ -2073,7 +2074,7 @@
 </file>
 
 <file path=ppt/slideLayouts/slideLayout7.xml><?xml version="1.0" encoding="utf-8"?>
-<p:sldLayout xmlns:a="http://schemas.openxmlformats.org/drawingml/2006/main" xmlns:r="http://schemas.openxmlformats.org/officeDocument/2006/relationships" xmlns:p="http://schemas.openxmlformats.org/presentationml/2006/main" type="blank" preserve="1">
+<p:sldLayout xmlns:a="http://schemas.openxmlformats.org/drawingml/2006/main" xmlns:r="http://schemas.openxmlformats.org/officeDocument/2006/relationships" xmlns:p="http://schemas.openxmlformats.org/presentationml/2006/main" showMasterSp="0" type="blank" preserve="1">
   <p:cSld name="Leer">
     <p:spTree>
       <p:nvGrpSpPr>
@@ -2200,7 +2201,7 @@
 </file>
 
 <file path=ppt/slideLayouts/slideLayout8.xml><?xml version="1.0" encoding="utf-8"?>
-<p:sldLayout xmlns:a="http://schemas.openxmlformats.org/drawingml/2006/main" xmlns:r="http://schemas.openxmlformats.org/officeDocument/2006/relationships" xmlns:p="http://schemas.openxmlformats.org/presentationml/2006/main" type="objTx" preserve="1">
+<p:sldLayout xmlns:a="http://schemas.openxmlformats.org/drawingml/2006/main" xmlns:r="http://schemas.openxmlformats.org/officeDocument/2006/relationships" xmlns:p="http://schemas.openxmlformats.org/presentationml/2006/main" showMasterSp="0" type="objTx" preserve="1">
   <p:cSld name="Inhalt mit Überschrift">
     <p:spTree>
       <p:nvGrpSpPr>
@@ -2509,7 +2510,7 @@
 </file>
 
 <file path=ppt/slideLayouts/slideLayout9.xml><?xml version="1.0" encoding="utf-8"?>
-<p:sldLayout xmlns:a="http://schemas.openxmlformats.org/drawingml/2006/main" xmlns:r="http://schemas.openxmlformats.org/officeDocument/2006/relationships" xmlns:p="http://schemas.openxmlformats.org/presentationml/2006/main" type="picTx" preserve="1">
+<p:sldLayout xmlns:a="http://schemas.openxmlformats.org/drawingml/2006/main" xmlns:r="http://schemas.openxmlformats.org/officeDocument/2006/relationships" xmlns:p="http://schemas.openxmlformats.org/presentationml/2006/main" showMasterSp="0" type="picTx" preserve="1">
   <p:cSld name="Bild mit Überschrift">
     <p:spTree>
       <p:nvGrpSpPr>
@@ -2801,9 +2802,14 @@
 <p:sldMaster xmlns:a="http://schemas.openxmlformats.org/drawingml/2006/main" xmlns:r="http://schemas.openxmlformats.org/officeDocument/2006/relationships" xmlns:p="http://schemas.openxmlformats.org/presentationml/2006/main">
   <p:cSld>
     <p:bg>
-      <p:bgRef idx="1001">
-        <a:schemeClr val="bg1"/>
-      </p:bgRef>
+      <p:bgPr>
+        <a:solidFill>
+          <a:schemeClr val="bg1">
+            <a:alpha val="0"/>
+          </a:schemeClr>
+        </a:solidFill>
+        <a:effectLst/>
+      </p:bgPr>
     </p:bg>
     <p:spTree>
       <p:nvGrpSpPr>
@@ -3373,7 +3379,7 @@
 </file>
 
 <file path=ppt/slides/slide1.xml><?xml version="1.0" encoding="utf-8"?>
-<p:sld xmlns:a="http://schemas.openxmlformats.org/drawingml/2006/main" xmlns:r="http://schemas.openxmlformats.org/officeDocument/2006/relationships" xmlns:p="http://schemas.openxmlformats.org/presentationml/2006/main">
+<p:sld xmlns:a="http://schemas.openxmlformats.org/drawingml/2006/main" xmlns:r="http://schemas.openxmlformats.org/officeDocument/2006/relationships" xmlns:p="http://schemas.openxmlformats.org/presentationml/2006/main" showMasterSp="0">
   <p:cSld>
     <p:spTree>
       <p:nvGrpSpPr>
@@ -3446,7 +3452,7 @@
 </file>
 
 <file path=ppt/slides/slide10.xml><?xml version="1.0" encoding="utf-8"?>
-<p:sld xmlns:a="http://schemas.openxmlformats.org/drawingml/2006/main" xmlns:r="http://schemas.openxmlformats.org/officeDocument/2006/relationships" xmlns:p="http://schemas.openxmlformats.org/presentationml/2006/main">
+<p:sld xmlns:a="http://schemas.openxmlformats.org/drawingml/2006/main" xmlns:r="http://schemas.openxmlformats.org/officeDocument/2006/relationships" xmlns:p="http://schemas.openxmlformats.org/presentationml/2006/main" showMasterSp="0">
   <p:cSld>
     <p:spTree>
       <p:nvGrpSpPr>
@@ -3633,7 +3639,7 @@
 </file>
 
 <file path=ppt/slides/slide11.xml><?xml version="1.0" encoding="utf-8"?>
-<p:sld xmlns:a="http://schemas.openxmlformats.org/drawingml/2006/main" xmlns:r="http://schemas.openxmlformats.org/officeDocument/2006/relationships" xmlns:p="http://schemas.openxmlformats.org/presentationml/2006/main">
+<p:sld xmlns:a="http://schemas.openxmlformats.org/drawingml/2006/main" xmlns:r="http://schemas.openxmlformats.org/officeDocument/2006/relationships" xmlns:p="http://schemas.openxmlformats.org/presentationml/2006/main" showMasterSp="0">
   <p:cSld>
     <p:spTree>
       <p:nvGrpSpPr>
@@ -3820,7 +3826,7 @@
 </file>
 
 <file path=ppt/slides/slide12.xml><?xml version="1.0" encoding="utf-8"?>
-<p:sld xmlns:a="http://schemas.openxmlformats.org/drawingml/2006/main" xmlns:r="http://schemas.openxmlformats.org/officeDocument/2006/relationships" xmlns:p="http://schemas.openxmlformats.org/presentationml/2006/main">
+<p:sld xmlns:a="http://schemas.openxmlformats.org/drawingml/2006/main" xmlns:r="http://schemas.openxmlformats.org/officeDocument/2006/relationships" xmlns:p="http://schemas.openxmlformats.org/presentationml/2006/main" showMasterSp="0">
   <p:cSld>
     <p:spTree>
       <p:nvGrpSpPr>
@@ -3952,7 +3958,7 @@
 </file>
 
 <file path=ppt/slides/slide13.xml><?xml version="1.0" encoding="utf-8"?>
-<p:sld xmlns:a="http://schemas.openxmlformats.org/drawingml/2006/main" xmlns:r="http://schemas.openxmlformats.org/officeDocument/2006/relationships" xmlns:p="http://schemas.openxmlformats.org/presentationml/2006/main">
+<p:sld xmlns:a="http://schemas.openxmlformats.org/drawingml/2006/main" xmlns:r="http://schemas.openxmlformats.org/officeDocument/2006/relationships" xmlns:p="http://schemas.openxmlformats.org/presentationml/2006/main" showMasterSp="0">
   <p:cSld>
     <p:spTree>
       <p:nvGrpSpPr>
@@ -4552,7 +4558,7 @@
 </file>
 
 <file path=ppt/slides/slide14.xml><?xml version="1.0" encoding="utf-8"?>
-<p:sld xmlns:a="http://schemas.openxmlformats.org/drawingml/2006/main" xmlns:r="http://schemas.openxmlformats.org/officeDocument/2006/relationships" xmlns:p="http://schemas.openxmlformats.org/presentationml/2006/main">
+<p:sld xmlns:a="http://schemas.openxmlformats.org/drawingml/2006/main" xmlns:r="http://schemas.openxmlformats.org/officeDocument/2006/relationships" xmlns:p="http://schemas.openxmlformats.org/presentationml/2006/main" showMasterSp="0">
   <p:cSld>
     <p:spTree>
       <p:nvGrpSpPr>
@@ -5268,7 +5274,7 @@
 </file>
 
 <file path=ppt/slides/slide15.xml><?xml version="1.0" encoding="utf-8"?>
-<p:sld xmlns:a="http://schemas.openxmlformats.org/drawingml/2006/main" xmlns:r="http://schemas.openxmlformats.org/officeDocument/2006/relationships" xmlns:p="http://schemas.openxmlformats.org/presentationml/2006/main">
+<p:sld xmlns:a="http://schemas.openxmlformats.org/drawingml/2006/main" xmlns:r="http://schemas.openxmlformats.org/officeDocument/2006/relationships" xmlns:p="http://schemas.openxmlformats.org/presentationml/2006/main" showMasterSp="0">
   <p:cSld>
     <p:spTree>
       <p:nvGrpSpPr>
@@ -6051,7 +6057,7 @@
 </file>
 
 <file path=ppt/slides/slide16.xml><?xml version="1.0" encoding="utf-8"?>
-<p:sld xmlns:a="http://schemas.openxmlformats.org/drawingml/2006/main" xmlns:r="http://schemas.openxmlformats.org/officeDocument/2006/relationships" xmlns:p="http://schemas.openxmlformats.org/presentationml/2006/main">
+<p:sld xmlns:a="http://schemas.openxmlformats.org/drawingml/2006/main" xmlns:r="http://schemas.openxmlformats.org/officeDocument/2006/relationships" xmlns:p="http://schemas.openxmlformats.org/presentationml/2006/main" showMasterSp="0">
   <p:cSld>
     <p:spTree>
       <p:nvGrpSpPr>
@@ -6425,7 +6431,7 @@
 </file>
 
 <file path=ppt/slides/slide17.xml><?xml version="1.0" encoding="utf-8"?>
-<p:sld xmlns:a="http://schemas.openxmlformats.org/drawingml/2006/main" xmlns:r="http://schemas.openxmlformats.org/officeDocument/2006/relationships" xmlns:p="http://schemas.openxmlformats.org/presentationml/2006/main">
+<p:sld xmlns:a="http://schemas.openxmlformats.org/drawingml/2006/main" xmlns:r="http://schemas.openxmlformats.org/officeDocument/2006/relationships" xmlns:p="http://schemas.openxmlformats.org/presentationml/2006/main" showMasterSp="0">
   <p:cSld>
     <p:spTree>
       <p:nvGrpSpPr>
@@ -6653,7 +6659,7 @@
 </file>
 
 <file path=ppt/slides/slide18.xml><?xml version="1.0" encoding="utf-8"?>
-<p:sld xmlns:a="http://schemas.openxmlformats.org/drawingml/2006/main" xmlns:r="http://schemas.openxmlformats.org/officeDocument/2006/relationships" xmlns:p="http://schemas.openxmlformats.org/presentationml/2006/main">
+<p:sld xmlns:a="http://schemas.openxmlformats.org/drawingml/2006/main" xmlns:r="http://schemas.openxmlformats.org/officeDocument/2006/relationships" xmlns:p="http://schemas.openxmlformats.org/presentationml/2006/main" showMasterSp="0">
   <p:cSld>
     <p:spTree>
       <p:nvGrpSpPr>
@@ -6829,7 +6835,7 @@
 </file>
 
 <file path=ppt/slides/slide19.xml><?xml version="1.0" encoding="utf-8"?>
-<p:sld xmlns:a="http://schemas.openxmlformats.org/drawingml/2006/main" xmlns:r="http://schemas.openxmlformats.org/officeDocument/2006/relationships" xmlns:p="http://schemas.openxmlformats.org/presentationml/2006/main">
+<p:sld xmlns:a="http://schemas.openxmlformats.org/drawingml/2006/main" xmlns:r="http://schemas.openxmlformats.org/officeDocument/2006/relationships" xmlns:p="http://schemas.openxmlformats.org/presentationml/2006/main" showMasterSp="0">
   <p:cSld>
     <p:spTree>
       <p:nvGrpSpPr>
@@ -7000,7 +7006,7 @@
 </file>
 
 <file path=ppt/slides/slide2.xml><?xml version="1.0" encoding="utf-8"?>
-<p:sld xmlns:a="http://schemas.openxmlformats.org/drawingml/2006/main" xmlns:r="http://schemas.openxmlformats.org/officeDocument/2006/relationships" xmlns:p="http://schemas.openxmlformats.org/presentationml/2006/main">
+<p:sld xmlns:a="http://schemas.openxmlformats.org/drawingml/2006/main" xmlns:r="http://schemas.openxmlformats.org/officeDocument/2006/relationships" xmlns:p="http://schemas.openxmlformats.org/presentationml/2006/main" showMasterSp="0">
   <p:cSld>
     <p:spTree>
       <p:nvGrpSpPr>
@@ -7196,7 +7202,7 @@
 </file>
 
 <file path=ppt/slides/slide20.xml><?xml version="1.0" encoding="utf-8"?>
-<p:sld xmlns:a="http://schemas.openxmlformats.org/drawingml/2006/main" xmlns:r="http://schemas.openxmlformats.org/officeDocument/2006/relationships" xmlns:p="http://schemas.openxmlformats.org/presentationml/2006/main">
+<p:sld xmlns:a="http://schemas.openxmlformats.org/drawingml/2006/main" xmlns:r="http://schemas.openxmlformats.org/officeDocument/2006/relationships" xmlns:p="http://schemas.openxmlformats.org/presentationml/2006/main" showMasterSp="0">
   <p:cSld>
     <p:spTree>
       <p:nvGrpSpPr>
@@ -7364,7 +7370,7 @@
 </file>
 
 <file path=ppt/slides/slide21.xml><?xml version="1.0" encoding="utf-8"?>
-<p:sld xmlns:a="http://schemas.openxmlformats.org/drawingml/2006/main" xmlns:r="http://schemas.openxmlformats.org/officeDocument/2006/relationships" xmlns:p="http://schemas.openxmlformats.org/presentationml/2006/main">
+<p:sld xmlns:a="http://schemas.openxmlformats.org/drawingml/2006/main" xmlns:r="http://schemas.openxmlformats.org/officeDocument/2006/relationships" xmlns:p="http://schemas.openxmlformats.org/presentationml/2006/main" showMasterSp="0">
   <p:cSld>
     <p:spTree>
       <p:nvGrpSpPr>
@@ -8143,8 +8149,272 @@
 </p:sld>
 </file>
 
+<file path=ppt/slides/slide22.xml><?xml version="1.0" encoding="utf-8"?>
+<p:sld xmlns:a="http://schemas.openxmlformats.org/drawingml/2006/main" xmlns:r="http://schemas.openxmlformats.org/officeDocument/2006/relationships" xmlns:p="http://schemas.openxmlformats.org/presentationml/2006/main">
+  <p:cSld>
+    <p:spTree>
+      <p:nvGrpSpPr>
+        <p:cNvPr id="1" name=""/>
+        <p:cNvGrpSpPr/>
+        <p:nvPr/>
+      </p:nvGrpSpPr>
+      <p:grpSpPr>
+        <a:xfrm>
+          <a:off x="0" y="0"/>
+          <a:ext cx="0" cy="0"/>
+          <a:chOff x="0" y="0"/>
+          <a:chExt cx="0" cy="0"/>
+        </a:xfrm>
+      </p:grpSpPr>
+      <p:sp>
+        <p:nvSpPr>
+          <p:cNvPr id="4" name="Rad 3"/>
+          <p:cNvSpPr/>
+          <p:nvPr/>
+        </p:nvSpPr>
+        <p:spPr>
+          <a:xfrm>
+            <a:off x="802500" y="802500"/>
+            <a:ext cx="7920000" cy="7920000"/>
+          </a:xfrm>
+          <a:prstGeom prst="donut">
+            <a:avLst>
+              <a:gd name="adj" fmla="val 8572"/>
+            </a:avLst>
+          </a:prstGeom>
+          <a:solidFill>
+            <a:srgbClr val="00B0F0"/>
+          </a:solidFill>
+          <a:ln>
+            <a:noFill/>
+          </a:ln>
+        </p:spPr>
+        <p:style>
+          <a:lnRef idx="2">
+            <a:schemeClr val="accent1">
+              <a:shade val="50000"/>
+            </a:schemeClr>
+          </a:lnRef>
+          <a:fillRef idx="1">
+            <a:schemeClr val="accent1"/>
+          </a:fillRef>
+          <a:effectRef idx="0">
+            <a:schemeClr val="accent1"/>
+          </a:effectRef>
+          <a:fontRef idx="minor">
+            <a:schemeClr val="lt1"/>
+          </a:fontRef>
+        </p:style>
+        <p:txBody>
+          <a:bodyPr rtlCol="0" anchor="ctr"/>
+          <a:lstStyle/>
+          <a:p>
+            <a:pPr algn="ctr"/>
+            <a:endParaRPr lang="de-DE"/>
+          </a:p>
+        </p:txBody>
+      </p:sp>
+      <p:sp>
+        <p:nvSpPr>
+          <p:cNvPr id="7" name="Rad 6"/>
+          <p:cNvSpPr/>
+          <p:nvPr/>
+        </p:nvSpPr>
+        <p:spPr>
+          <a:xfrm>
+            <a:off x="2679448" y="802500"/>
+            <a:ext cx="4166104" cy="7920000"/>
+          </a:xfrm>
+          <a:prstGeom prst="donut">
+            <a:avLst>
+              <a:gd name="adj" fmla="val 16196"/>
+            </a:avLst>
+          </a:prstGeom>
+          <a:solidFill>
+            <a:srgbClr val="00B0F0"/>
+          </a:solidFill>
+          <a:ln>
+            <a:noFill/>
+          </a:ln>
+        </p:spPr>
+        <p:style>
+          <a:lnRef idx="2">
+            <a:schemeClr val="accent1">
+              <a:shade val="50000"/>
+            </a:schemeClr>
+          </a:lnRef>
+          <a:fillRef idx="1">
+            <a:schemeClr val="accent1"/>
+          </a:fillRef>
+          <a:effectRef idx="0">
+            <a:schemeClr val="accent1"/>
+          </a:effectRef>
+          <a:fontRef idx="minor">
+            <a:schemeClr val="lt1"/>
+          </a:fontRef>
+        </p:style>
+        <p:txBody>
+          <a:bodyPr rtlCol="0" anchor="ctr"/>
+          <a:lstStyle/>
+          <a:p>
+            <a:pPr algn="ctr"/>
+            <a:endParaRPr lang="de-DE"/>
+          </a:p>
+        </p:txBody>
+      </p:sp>
+      <p:sp>
+        <p:nvSpPr>
+          <p:cNvPr id="9" name="Rechteck 8"/>
+          <p:cNvSpPr/>
+          <p:nvPr/>
+        </p:nvSpPr>
+        <p:spPr>
+          <a:xfrm>
+            <a:off x="1700097" y="6241296"/>
+            <a:ext cx="6124807" cy="683611"/>
+          </a:xfrm>
+          <a:prstGeom prst="rect">
+            <a:avLst/>
+          </a:prstGeom>
+          <a:solidFill>
+            <a:srgbClr val="00B0F0"/>
+          </a:solidFill>
+          <a:ln>
+            <a:noFill/>
+          </a:ln>
+        </p:spPr>
+        <p:style>
+          <a:lnRef idx="2">
+            <a:schemeClr val="accent1">
+              <a:shade val="50000"/>
+            </a:schemeClr>
+          </a:lnRef>
+          <a:fillRef idx="1">
+            <a:schemeClr val="accent1"/>
+          </a:fillRef>
+          <a:effectRef idx="0">
+            <a:schemeClr val="accent1"/>
+          </a:effectRef>
+          <a:fontRef idx="minor">
+            <a:schemeClr val="lt1"/>
+          </a:fontRef>
+        </p:style>
+        <p:txBody>
+          <a:bodyPr rtlCol="0" anchor="ctr"/>
+          <a:lstStyle/>
+          <a:p>
+            <a:pPr algn="ctr"/>
+            <a:endParaRPr lang="de-DE"/>
+          </a:p>
+        </p:txBody>
+      </p:sp>
+      <p:sp>
+        <p:nvSpPr>
+          <p:cNvPr id="11" name="Rechteck 10"/>
+          <p:cNvSpPr/>
+          <p:nvPr/>
+        </p:nvSpPr>
+        <p:spPr>
+          <a:xfrm>
+            <a:off x="1700095" y="2600094"/>
+            <a:ext cx="6124807" cy="683611"/>
+          </a:xfrm>
+          <a:prstGeom prst="rect">
+            <a:avLst/>
+          </a:prstGeom>
+          <a:solidFill>
+            <a:srgbClr val="00B0F0"/>
+          </a:solidFill>
+          <a:ln>
+            <a:noFill/>
+          </a:ln>
+        </p:spPr>
+        <p:style>
+          <a:lnRef idx="2">
+            <a:schemeClr val="accent1">
+              <a:shade val="50000"/>
+            </a:schemeClr>
+          </a:lnRef>
+          <a:fillRef idx="1">
+            <a:schemeClr val="accent1"/>
+          </a:fillRef>
+          <a:effectRef idx="0">
+            <a:schemeClr val="accent1"/>
+          </a:effectRef>
+          <a:fontRef idx="minor">
+            <a:schemeClr val="lt1"/>
+          </a:fontRef>
+        </p:style>
+        <p:txBody>
+          <a:bodyPr rtlCol="0" anchor="ctr"/>
+          <a:lstStyle/>
+          <a:p>
+            <a:pPr algn="ctr"/>
+            <a:endParaRPr lang="de-DE"/>
+          </a:p>
+        </p:txBody>
+      </p:sp>
+      <p:sp>
+        <p:nvSpPr>
+          <p:cNvPr id="12" name="Rechteck 11"/>
+          <p:cNvSpPr/>
+          <p:nvPr/>
+        </p:nvSpPr>
+        <p:spPr>
+          <a:xfrm>
+            <a:off x="1037993" y="4420695"/>
+            <a:ext cx="7449014" cy="683611"/>
+          </a:xfrm>
+          <a:prstGeom prst="rect">
+            <a:avLst/>
+          </a:prstGeom>
+          <a:solidFill>
+            <a:srgbClr val="00B0F0"/>
+          </a:solidFill>
+          <a:ln>
+            <a:noFill/>
+          </a:ln>
+        </p:spPr>
+        <p:style>
+          <a:lnRef idx="2">
+            <a:schemeClr val="accent1">
+              <a:shade val="50000"/>
+            </a:schemeClr>
+          </a:lnRef>
+          <a:fillRef idx="1">
+            <a:schemeClr val="accent1"/>
+          </a:fillRef>
+          <a:effectRef idx="0">
+            <a:schemeClr val="accent1"/>
+          </a:effectRef>
+          <a:fontRef idx="minor">
+            <a:schemeClr val="lt1"/>
+          </a:fontRef>
+        </p:style>
+        <p:txBody>
+          <a:bodyPr rtlCol="0" anchor="ctr"/>
+          <a:lstStyle/>
+          <a:p>
+            <a:pPr algn="ctr"/>
+            <a:endParaRPr lang="de-DE"/>
+          </a:p>
+        </p:txBody>
+      </p:sp>
+    </p:spTree>
+    <p:extLst>
+      <p:ext uri="{BB962C8B-B14F-4D97-AF65-F5344CB8AC3E}">
+        <p14:creationId xmlns:p14="http://schemas.microsoft.com/office/powerpoint/2010/main" val="1587640748"/>
+      </p:ext>
+    </p:extLst>
+  </p:cSld>
+  <p:clrMapOvr>
+    <a:masterClrMapping/>
+  </p:clrMapOvr>
+</p:sld>
+</file>
+
 <file path=ppt/slides/slide3.xml><?xml version="1.0" encoding="utf-8"?>
-<p:sld xmlns:a="http://schemas.openxmlformats.org/drawingml/2006/main" xmlns:r="http://schemas.openxmlformats.org/officeDocument/2006/relationships" xmlns:p="http://schemas.openxmlformats.org/presentationml/2006/main">
+<p:sld xmlns:a="http://schemas.openxmlformats.org/drawingml/2006/main" xmlns:r="http://schemas.openxmlformats.org/officeDocument/2006/relationships" xmlns:p="http://schemas.openxmlformats.org/presentationml/2006/main" showMasterSp="0">
   <p:cSld>
     <p:spTree>
       <p:nvGrpSpPr>
@@ -8329,7 +8599,7 @@
 </file>
 
 <file path=ppt/slides/slide4.xml><?xml version="1.0" encoding="utf-8"?>
-<p:sld xmlns:a="http://schemas.openxmlformats.org/drawingml/2006/main" xmlns:r="http://schemas.openxmlformats.org/officeDocument/2006/relationships" xmlns:p="http://schemas.openxmlformats.org/presentationml/2006/main">
+<p:sld xmlns:a="http://schemas.openxmlformats.org/drawingml/2006/main" xmlns:r="http://schemas.openxmlformats.org/officeDocument/2006/relationships" xmlns:p="http://schemas.openxmlformats.org/presentationml/2006/main" showMasterSp="0">
   <p:cSld>
     <p:spTree>
       <p:nvGrpSpPr>
@@ -8405,7 +8675,7 @@
 </file>
 
 <file path=ppt/slides/slide5.xml><?xml version="1.0" encoding="utf-8"?>
-<p:sld xmlns:a="http://schemas.openxmlformats.org/drawingml/2006/main" xmlns:r="http://schemas.openxmlformats.org/officeDocument/2006/relationships" xmlns:p="http://schemas.openxmlformats.org/presentationml/2006/main">
+<p:sld xmlns:a="http://schemas.openxmlformats.org/drawingml/2006/main" xmlns:r="http://schemas.openxmlformats.org/officeDocument/2006/relationships" xmlns:p="http://schemas.openxmlformats.org/presentationml/2006/main" showMasterSp="0">
   <p:cSld>
     <p:spTree>
       <p:nvGrpSpPr>
@@ -8485,7 +8755,7 @@
 </file>
 
 <file path=ppt/slides/slide6.xml><?xml version="1.0" encoding="utf-8"?>
-<p:sld xmlns:a="http://schemas.openxmlformats.org/drawingml/2006/main" xmlns:r="http://schemas.openxmlformats.org/officeDocument/2006/relationships" xmlns:p="http://schemas.openxmlformats.org/presentationml/2006/main">
+<p:sld xmlns:a="http://schemas.openxmlformats.org/drawingml/2006/main" xmlns:r="http://schemas.openxmlformats.org/officeDocument/2006/relationships" xmlns:p="http://schemas.openxmlformats.org/presentationml/2006/main" showMasterSp="0">
   <p:cSld>
     <p:spTree>
       <p:nvGrpSpPr>
@@ -8565,7 +8835,7 @@
 </file>
 
 <file path=ppt/slides/slide7.xml><?xml version="1.0" encoding="utf-8"?>
-<p:sld xmlns:a="http://schemas.openxmlformats.org/drawingml/2006/main" xmlns:r="http://schemas.openxmlformats.org/officeDocument/2006/relationships" xmlns:p="http://schemas.openxmlformats.org/presentationml/2006/main">
+<p:sld xmlns:a="http://schemas.openxmlformats.org/drawingml/2006/main" xmlns:r="http://schemas.openxmlformats.org/officeDocument/2006/relationships" xmlns:p="http://schemas.openxmlformats.org/presentationml/2006/main" showMasterSp="0">
   <p:cSld>
     <p:spTree>
       <p:nvGrpSpPr>
@@ -9022,7 +9292,7 @@
 </file>
 
 <file path=ppt/slides/slide8.xml><?xml version="1.0" encoding="utf-8"?>
-<p:sld xmlns:a="http://schemas.openxmlformats.org/drawingml/2006/main" xmlns:r="http://schemas.openxmlformats.org/officeDocument/2006/relationships" xmlns:p="http://schemas.openxmlformats.org/presentationml/2006/main">
+<p:sld xmlns:a="http://schemas.openxmlformats.org/drawingml/2006/main" xmlns:r="http://schemas.openxmlformats.org/officeDocument/2006/relationships" xmlns:p="http://schemas.openxmlformats.org/presentationml/2006/main" showMasterSp="0">
   <p:cSld>
     <p:spTree>
       <p:nvGrpSpPr>
@@ -9277,7 +9547,7 @@
 </file>
 
 <file path=ppt/slides/slide9.xml><?xml version="1.0" encoding="utf-8"?>
-<p:sld xmlns:a="http://schemas.openxmlformats.org/drawingml/2006/main" xmlns:r="http://schemas.openxmlformats.org/officeDocument/2006/relationships" xmlns:p="http://schemas.openxmlformats.org/presentationml/2006/main">
+<p:sld xmlns:a="http://schemas.openxmlformats.org/drawingml/2006/main" xmlns:r="http://schemas.openxmlformats.org/officeDocument/2006/relationships" xmlns:p="http://schemas.openxmlformats.org/presentationml/2006/main" showMasterSp="0">
   <p:cSld>
     <p:spTree>
       <p:nvGrpSpPr>

</xml_diff>

<commit_message>
New Icons, new version name, cleaned main class, cleaned more classes, deleted class that wasn't used
</commit_message>
<xml_diff>
--- a/ImageResources/ProjectFiles/menu.pptx
+++ b/ImageResources/ProjectFiles/menu.pptx
@@ -27,6 +27,10 @@
     <p:sldId id="279" r:id="rId21"/>
     <p:sldId id="280" r:id="rId22"/>
     <p:sldId id="284" r:id="rId23"/>
+    <p:sldId id="285" r:id="rId24"/>
+    <p:sldId id="286" r:id="rId25"/>
+    <p:sldId id="288" r:id="rId26"/>
+    <p:sldId id="289" r:id="rId27"/>
   </p:sldIdLst>
   <p:sldSz cx="9525000" cy="9525000"/>
   <p:notesSz cx="6858000" cy="9144000"/>
@@ -282,7 +286,7 @@
                 </a:solidFill>
               </a:rPr>
               <a:pPr/>
-              <a:t>03.10.2017</a:t>
+              <a:t>04.10.2017</a:t>
             </a:fld>
             <a:endParaRPr lang="de-DE">
               <a:solidFill>
@@ -484,7 +488,7 @@
                 </a:solidFill>
               </a:rPr>
               <a:pPr/>
-              <a:t>03.10.2017</a:t>
+              <a:t>04.10.2017</a:t>
             </a:fld>
             <a:endParaRPr lang="de-DE">
               <a:solidFill>
@@ -696,7 +700,7 @@
                 </a:solidFill>
               </a:rPr>
               <a:pPr/>
-              <a:t>03.10.2017</a:t>
+              <a:t>04.10.2017</a:t>
             </a:fld>
             <a:endParaRPr lang="de-DE">
               <a:solidFill>
@@ -898,7 +902,7 @@
                 </a:solidFill>
               </a:rPr>
               <a:pPr/>
-              <a:t>03.10.2017</a:t>
+              <a:t>04.10.2017</a:t>
             </a:fld>
             <a:endParaRPr lang="de-DE">
               <a:solidFill>
@@ -1174,7 +1178,7 @@
                 </a:solidFill>
               </a:rPr>
               <a:pPr/>
-              <a:t>03.10.2017</a:t>
+              <a:t>04.10.2017</a:t>
             </a:fld>
             <a:endParaRPr lang="de-DE">
               <a:solidFill>
@@ -1438,7 +1442,7 @@
                 </a:solidFill>
               </a:rPr>
               <a:pPr/>
-              <a:t>03.10.2017</a:t>
+              <a:t>04.10.2017</a:t>
             </a:fld>
             <a:endParaRPr lang="de-DE">
               <a:solidFill>
@@ -1837,7 +1841,7 @@
                 </a:solidFill>
               </a:rPr>
               <a:pPr/>
-              <a:t>03.10.2017</a:t>
+              <a:t>04.10.2017</a:t>
             </a:fld>
             <a:endParaRPr lang="de-DE">
               <a:solidFill>
@@ -1987,7 +1991,7 @@
                 </a:solidFill>
               </a:rPr>
               <a:pPr/>
-              <a:t>03.10.2017</a:t>
+              <a:t>04.10.2017</a:t>
             </a:fld>
             <a:endParaRPr lang="de-DE">
               <a:solidFill>
@@ -2114,7 +2118,7 @@
                 </a:solidFill>
               </a:rPr>
               <a:pPr/>
-              <a:t>03.10.2017</a:t>
+              <a:t>04.10.2017</a:t>
             </a:fld>
             <a:endParaRPr lang="de-DE">
               <a:solidFill>
@@ -2423,7 +2427,7 @@
                 </a:solidFill>
               </a:rPr>
               <a:pPr/>
-              <a:t>03.10.2017</a:t>
+              <a:t>04.10.2017</a:t>
             </a:fld>
             <a:endParaRPr lang="de-DE">
               <a:solidFill>
@@ -2712,7 +2716,7 @@
                 </a:solidFill>
               </a:rPr>
               <a:pPr/>
-              <a:t>03.10.2017</a:t>
+              <a:t>04.10.2017</a:t>
             </a:fld>
             <a:endParaRPr lang="de-DE">
               <a:solidFill>
@@ -2963,7 +2967,7 @@
                 </a:solidFill>
               </a:rPr>
               <a:pPr defTabSz="403228"/>
-              <a:t>03.10.2017</a:t>
+              <a:t>04.10.2017</a:t>
             </a:fld>
             <a:endParaRPr lang="de-DE">
               <a:solidFill>
@@ -8404,6 +8408,478 @@
     <p:extLst>
       <p:ext uri="{BB962C8B-B14F-4D97-AF65-F5344CB8AC3E}">
         <p14:creationId xmlns:p14="http://schemas.microsoft.com/office/powerpoint/2010/main" val="1587640748"/>
+      </p:ext>
+    </p:extLst>
+  </p:cSld>
+  <p:clrMapOvr>
+    <a:masterClrMapping/>
+  </p:clrMapOvr>
+</p:sld>
+</file>
+
+<file path=ppt/slides/slide23.xml><?xml version="1.0" encoding="utf-8"?>
+<p:sld xmlns:a="http://schemas.openxmlformats.org/drawingml/2006/main" xmlns:r="http://schemas.openxmlformats.org/officeDocument/2006/relationships" xmlns:p="http://schemas.openxmlformats.org/presentationml/2006/main" showMasterSp="0">
+  <p:cSld>
+    <p:spTree>
+      <p:nvGrpSpPr>
+        <p:cNvPr id="1" name=""/>
+        <p:cNvGrpSpPr/>
+        <p:nvPr/>
+      </p:nvGrpSpPr>
+      <p:grpSpPr>
+        <a:xfrm>
+          <a:off x="0" y="0"/>
+          <a:ext cx="0" cy="0"/>
+          <a:chOff x="0" y="0"/>
+          <a:chExt cx="0" cy="0"/>
+        </a:xfrm>
+      </p:grpSpPr>
+      <p:sp>
+        <p:nvSpPr>
+          <p:cNvPr id="4" name="Additionszeichen 3"/>
+          <p:cNvSpPr/>
+          <p:nvPr/>
+        </p:nvSpPr>
+        <p:spPr>
+          <a:xfrm>
+            <a:off x="-105" y="-209"/>
+            <a:ext cx="9525209" cy="9525209"/>
+          </a:xfrm>
+          <a:prstGeom prst="mathMultiply">
+            <a:avLst>
+              <a:gd name="adj1" fmla="val 20476"/>
+            </a:avLst>
+          </a:prstGeom>
+          <a:solidFill>
+            <a:schemeClr val="accent2"/>
+          </a:solidFill>
+          <a:ln>
+            <a:noFill/>
+          </a:ln>
+          <a:effectLst/>
+          <a:scene3d>
+            <a:camera prst="orthographicFront"/>
+            <a:lightRig rig="threePt" dir="t"/>
+          </a:scene3d>
+          <a:sp3d extrusionH="1270000"/>
+        </p:spPr>
+        <p:style>
+          <a:lnRef idx="0">
+            <a:schemeClr val="accent6"/>
+          </a:lnRef>
+          <a:fillRef idx="3">
+            <a:schemeClr val="accent6"/>
+          </a:fillRef>
+          <a:effectRef idx="3">
+            <a:schemeClr val="accent6"/>
+          </a:effectRef>
+          <a:fontRef idx="minor">
+            <a:schemeClr val="lt1"/>
+          </a:fontRef>
+        </p:style>
+        <p:txBody>
+          <a:bodyPr rtlCol="0" anchor="ctr"/>
+          <a:lstStyle/>
+          <a:p>
+            <a:pPr algn="ctr"/>
+            <a:endParaRPr lang="de-DE" sz="1588"/>
+          </a:p>
+        </p:txBody>
+      </p:sp>
+    </p:spTree>
+    <p:extLst>
+      <p:ext uri="{BB962C8B-B14F-4D97-AF65-F5344CB8AC3E}">
+        <p14:creationId xmlns:p14="http://schemas.microsoft.com/office/powerpoint/2010/main" val="124160770"/>
+      </p:ext>
+    </p:extLst>
+  </p:cSld>
+  <p:clrMapOvr>
+    <a:masterClrMapping/>
+  </p:clrMapOvr>
+</p:sld>
+</file>
+
+<file path=ppt/slides/slide24.xml><?xml version="1.0" encoding="utf-8"?>
+<p:sld xmlns:a="http://schemas.openxmlformats.org/drawingml/2006/main" xmlns:r="http://schemas.openxmlformats.org/officeDocument/2006/relationships" xmlns:p="http://schemas.openxmlformats.org/presentationml/2006/main" showMasterSp="0">
+  <p:cSld>
+    <p:spTree>
+      <p:nvGrpSpPr>
+        <p:cNvPr id="1" name=""/>
+        <p:cNvGrpSpPr/>
+        <p:nvPr/>
+      </p:nvGrpSpPr>
+      <p:grpSpPr>
+        <a:xfrm>
+          <a:off x="0" y="0"/>
+          <a:ext cx="0" cy="0"/>
+          <a:chOff x="0" y="0"/>
+          <a:chExt cx="0" cy="0"/>
+        </a:xfrm>
+      </p:grpSpPr>
+      <p:sp>
+        <p:nvSpPr>
+          <p:cNvPr id="6" name="Freihandform 5"/>
+          <p:cNvSpPr/>
+          <p:nvPr/>
+        </p:nvSpPr>
+        <p:spPr>
+          <a:xfrm rot="13186723">
+            <a:off x="3311925" y="356745"/>
+            <a:ext cx="2378636" cy="9711396"/>
+          </a:xfrm>
+          <a:custGeom>
+            <a:avLst/>
+            <a:gdLst>
+              <a:gd name="connsiteX0" fmla="*/ 1189318 w 2378636"/>
+              <a:gd name="connsiteY0" fmla="*/ 0 h 9711396"/>
+              <a:gd name="connsiteX1" fmla="*/ 2378636 w 2378636"/>
+              <a:gd name="connsiteY1" fmla="*/ 1886505 h 9711396"/>
+              <a:gd name="connsiteX2" fmla="*/ 2378636 w 2378636"/>
+              <a:gd name="connsiteY2" fmla="*/ 9711396 h 9711396"/>
+              <a:gd name="connsiteX3" fmla="*/ 0 w 2378636"/>
+              <a:gd name="connsiteY3" fmla="*/ 9711396 h 9711396"/>
+              <a:gd name="connsiteX4" fmla="*/ 0 w 2378636"/>
+              <a:gd name="connsiteY4" fmla="*/ 1886505 h 9711396"/>
+            </a:gdLst>
+            <a:ahLst/>
+            <a:cxnLst>
+              <a:cxn ang="0">
+                <a:pos x="connsiteX0" y="connsiteY0"/>
+              </a:cxn>
+              <a:cxn ang="0">
+                <a:pos x="connsiteX1" y="connsiteY1"/>
+              </a:cxn>
+              <a:cxn ang="0">
+                <a:pos x="connsiteX2" y="connsiteY2"/>
+              </a:cxn>
+              <a:cxn ang="0">
+                <a:pos x="connsiteX3" y="connsiteY3"/>
+              </a:cxn>
+              <a:cxn ang="0">
+                <a:pos x="connsiteX4" y="connsiteY4"/>
+              </a:cxn>
+            </a:cxnLst>
+            <a:rect l="l" t="t" r="r" b="b"/>
+            <a:pathLst>
+              <a:path w="2378636" h="9711396">
+                <a:moveTo>
+                  <a:pt x="1189318" y="0"/>
+                </a:moveTo>
+                <a:lnTo>
+                  <a:pt x="2378636" y="1886505"/>
+                </a:lnTo>
+                <a:lnTo>
+                  <a:pt x="2378636" y="9711396"/>
+                </a:lnTo>
+                <a:lnTo>
+                  <a:pt x="0" y="9711396"/>
+                </a:lnTo>
+                <a:lnTo>
+                  <a:pt x="0" y="1886505"/>
+                </a:lnTo>
+                <a:close/>
+              </a:path>
+            </a:pathLst>
+          </a:custGeom>
+          <a:solidFill>
+            <a:srgbClr val="7030A0"/>
+          </a:solidFill>
+          <a:ln>
+            <a:noFill/>
+          </a:ln>
+        </p:spPr>
+        <p:style>
+          <a:lnRef idx="2">
+            <a:schemeClr val="accent1">
+              <a:shade val="50000"/>
+            </a:schemeClr>
+          </a:lnRef>
+          <a:fillRef idx="1">
+            <a:schemeClr val="accent1"/>
+          </a:fillRef>
+          <a:effectRef idx="0">
+            <a:schemeClr val="accent1"/>
+          </a:effectRef>
+          <a:fontRef idx="minor">
+            <a:schemeClr val="lt1"/>
+          </a:fontRef>
+        </p:style>
+        <p:txBody>
+          <a:bodyPr rtlCol="0" anchor="ctr"/>
+          <a:lstStyle/>
+          <a:p>
+            <a:pPr algn="ctr"/>
+            <a:endParaRPr lang="de-DE"/>
+          </a:p>
+        </p:txBody>
+      </p:sp>
+    </p:spTree>
+    <p:extLst>
+      <p:ext uri="{BB962C8B-B14F-4D97-AF65-F5344CB8AC3E}">
+        <p14:creationId xmlns:p14="http://schemas.microsoft.com/office/powerpoint/2010/main" val="635187102"/>
+      </p:ext>
+    </p:extLst>
+  </p:cSld>
+  <p:clrMapOvr>
+    <a:masterClrMapping/>
+  </p:clrMapOvr>
+</p:sld>
+</file>
+
+<file path=ppt/slides/slide25.xml><?xml version="1.0" encoding="utf-8"?>
+<p:sld xmlns:a="http://schemas.openxmlformats.org/drawingml/2006/main" xmlns:r="http://schemas.openxmlformats.org/officeDocument/2006/relationships" xmlns:p="http://schemas.openxmlformats.org/presentationml/2006/main" showMasterSp="0">
+  <p:cSld>
+    <p:spTree>
+      <p:nvGrpSpPr>
+        <p:cNvPr id="1" name=""/>
+        <p:cNvGrpSpPr/>
+        <p:nvPr/>
+      </p:nvGrpSpPr>
+      <p:grpSpPr>
+        <a:xfrm>
+          <a:off x="0" y="0"/>
+          <a:ext cx="0" cy="0"/>
+          <a:chOff x="0" y="0"/>
+          <a:chExt cx="0" cy="0"/>
+        </a:xfrm>
+      </p:grpSpPr>
+      <p:sp>
+        <p:nvSpPr>
+          <p:cNvPr id="2" name="Ellipse 1"/>
+          <p:cNvSpPr/>
+          <p:nvPr/>
+        </p:nvSpPr>
+        <p:spPr>
+          <a:xfrm>
+            <a:off x="793663" y="793663"/>
+            <a:ext cx="7937675" cy="7937675"/>
+          </a:xfrm>
+          <a:prstGeom prst="ellipse">
+            <a:avLst/>
+          </a:prstGeom>
+          <a:solidFill>
+            <a:schemeClr val="tx1">
+              <a:lumMod val="75000"/>
+              <a:lumOff val="25000"/>
+            </a:schemeClr>
+          </a:solidFill>
+          <a:ln>
+            <a:noFill/>
+          </a:ln>
+        </p:spPr>
+        <p:style>
+          <a:lnRef idx="2">
+            <a:schemeClr val="accent1">
+              <a:shade val="50000"/>
+            </a:schemeClr>
+          </a:lnRef>
+          <a:fillRef idx="1">
+            <a:schemeClr val="accent1"/>
+          </a:fillRef>
+          <a:effectRef idx="0">
+            <a:schemeClr val="accent1"/>
+          </a:effectRef>
+          <a:fontRef idx="minor">
+            <a:schemeClr val="lt1"/>
+          </a:fontRef>
+        </p:style>
+        <p:txBody>
+          <a:bodyPr rtlCol="0" anchor="ctr"/>
+          <a:lstStyle/>
+          <a:p>
+            <a:pPr algn="ctr"/>
+            <a:endParaRPr lang="de-DE" sz="12172" b="1" dirty="0"/>
+          </a:p>
+        </p:txBody>
+      </p:sp>
+      <p:sp>
+        <p:nvSpPr>
+          <p:cNvPr id="7" name="Minuszeichen 3"/>
+          <p:cNvSpPr>
+            <a:spLocks noChangeAspect="1"/>
+          </p:cNvSpPr>
+          <p:nvPr/>
+        </p:nvSpPr>
+        <p:spPr>
+          <a:xfrm>
+            <a:off x="1576562" y="1576562"/>
+            <a:ext cx="6371876" cy="6371876"/>
+          </a:xfrm>
+          <a:prstGeom prst="mathMinus">
+            <a:avLst/>
+          </a:prstGeom>
+          <a:solidFill>
+            <a:schemeClr val="bg1"/>
+          </a:solidFill>
+          <a:ln>
+            <a:noFill/>
+          </a:ln>
+          <a:effectLst/>
+          <a:scene3d>
+            <a:camera prst="orthographicFront"/>
+            <a:lightRig rig="threePt" dir="t"/>
+          </a:scene3d>
+          <a:sp3d extrusionH="1270000"/>
+        </p:spPr>
+        <p:style>
+          <a:lnRef idx="0">
+            <a:schemeClr val="accent6"/>
+          </a:lnRef>
+          <a:fillRef idx="3">
+            <a:schemeClr val="accent6"/>
+          </a:fillRef>
+          <a:effectRef idx="3">
+            <a:schemeClr val="accent6"/>
+          </a:effectRef>
+          <a:fontRef idx="minor">
+            <a:schemeClr val="lt1"/>
+          </a:fontRef>
+        </p:style>
+        <p:txBody>
+          <a:bodyPr rtlCol="0" anchor="ctr"/>
+          <a:lstStyle/>
+          <a:p>
+            <a:pPr algn="ctr"/>
+            <a:endParaRPr lang="de-DE" sz="1588"/>
+          </a:p>
+        </p:txBody>
+      </p:sp>
+    </p:spTree>
+    <p:extLst>
+      <p:ext uri="{BB962C8B-B14F-4D97-AF65-F5344CB8AC3E}">
+        <p14:creationId xmlns:p14="http://schemas.microsoft.com/office/powerpoint/2010/main" val="1701544179"/>
+      </p:ext>
+    </p:extLst>
+  </p:cSld>
+  <p:clrMapOvr>
+    <a:masterClrMapping/>
+  </p:clrMapOvr>
+</p:sld>
+</file>
+
+<file path=ppt/slides/slide26.xml><?xml version="1.0" encoding="utf-8"?>
+<p:sld xmlns:a="http://schemas.openxmlformats.org/drawingml/2006/main" xmlns:r="http://schemas.openxmlformats.org/officeDocument/2006/relationships" xmlns:p="http://schemas.openxmlformats.org/presentationml/2006/main" showMasterSp="0">
+  <p:cSld>
+    <p:spTree>
+      <p:nvGrpSpPr>
+        <p:cNvPr id="1" name=""/>
+        <p:cNvGrpSpPr/>
+        <p:nvPr/>
+      </p:nvGrpSpPr>
+      <p:grpSpPr>
+        <a:xfrm>
+          <a:off x="0" y="0"/>
+          <a:ext cx="0" cy="0"/>
+          <a:chOff x="0" y="0"/>
+          <a:chExt cx="0" cy="0"/>
+        </a:xfrm>
+      </p:grpSpPr>
+      <p:sp>
+        <p:nvSpPr>
+          <p:cNvPr id="2" name="Rechteck 1"/>
+          <p:cNvSpPr/>
+          <p:nvPr/>
+        </p:nvSpPr>
+        <p:spPr>
+          <a:xfrm>
+            <a:off x="793663" y="793663"/>
+            <a:ext cx="7937675" cy="7937675"/>
+          </a:xfrm>
+          <a:prstGeom prst="rect">
+            <a:avLst/>
+          </a:prstGeom>
+          <a:noFill/>
+          <a:ln w="1016000" cap="rnd" cmpd="sng">
+            <a:solidFill>
+              <a:schemeClr val="accent1"/>
+            </a:solidFill>
+            <a:prstDash val="solid"/>
+            <a:round/>
+          </a:ln>
+        </p:spPr>
+        <p:style>
+          <a:lnRef idx="2">
+            <a:schemeClr val="accent1">
+              <a:shade val="50000"/>
+            </a:schemeClr>
+          </a:lnRef>
+          <a:fillRef idx="1">
+            <a:schemeClr val="accent1"/>
+          </a:fillRef>
+          <a:effectRef idx="0">
+            <a:schemeClr val="accent1"/>
+          </a:effectRef>
+          <a:fontRef idx="minor">
+            <a:schemeClr val="lt1"/>
+          </a:fontRef>
+        </p:style>
+        <p:txBody>
+          <a:bodyPr rtlCol="0" anchor="ctr"/>
+          <a:lstStyle/>
+          <a:p>
+            <a:pPr algn="ctr"/>
+            <a:endParaRPr lang="de-DE" sz="12172" b="1" dirty="0"/>
+          </a:p>
+        </p:txBody>
+      </p:sp>
+      <p:sp>
+        <p:nvSpPr>
+          <p:cNvPr id="7" name="Minuszeichen 3"/>
+          <p:cNvSpPr>
+            <a:spLocks noChangeAspect="1"/>
+          </p:cNvSpPr>
+          <p:nvPr/>
+        </p:nvSpPr>
+        <p:spPr>
+          <a:xfrm>
+            <a:off x="1576562" y="1576562"/>
+            <a:ext cx="6371876" cy="6371876"/>
+          </a:xfrm>
+          <a:prstGeom prst="mathMinus">
+            <a:avLst/>
+          </a:prstGeom>
+          <a:solidFill>
+            <a:schemeClr val="bg1">
+              <a:lumMod val="50000"/>
+            </a:schemeClr>
+          </a:solidFill>
+          <a:ln>
+            <a:noFill/>
+          </a:ln>
+          <a:effectLst/>
+          <a:scene3d>
+            <a:camera prst="orthographicFront"/>
+            <a:lightRig rig="threePt" dir="t"/>
+          </a:scene3d>
+          <a:sp3d extrusionH="1270000"/>
+        </p:spPr>
+        <p:style>
+          <a:lnRef idx="0">
+            <a:schemeClr val="accent6"/>
+          </a:lnRef>
+          <a:fillRef idx="3">
+            <a:schemeClr val="accent6"/>
+          </a:fillRef>
+          <a:effectRef idx="3">
+            <a:schemeClr val="accent6"/>
+          </a:effectRef>
+          <a:fontRef idx="minor">
+            <a:schemeClr val="lt1"/>
+          </a:fontRef>
+        </p:style>
+        <p:txBody>
+          <a:bodyPr rtlCol="0" anchor="ctr"/>
+          <a:lstStyle/>
+          <a:p>
+            <a:pPr algn="ctr"/>
+            <a:endParaRPr lang="de-DE" sz="1588"/>
+          </a:p>
+        </p:txBody>
+      </p:sp>
+    </p:spTree>
+    <p:extLst>
+      <p:ext uri="{BB962C8B-B14F-4D97-AF65-F5344CB8AC3E}">
+        <p14:creationId xmlns:p14="http://schemas.microsoft.com/office/powerpoint/2010/main" val="2661112814"/>
       </p:ext>
     </p:extLst>
   </p:cSld>

</xml_diff>

<commit_message>
Added new icons, corrected save process
But now there is a problem with the wrong formatted files window
</commit_message>
<xml_diff>
--- a/ImageResources/ProjectFiles/menu.pptx
+++ b/ImageResources/ProjectFiles/menu.pptx
@@ -16,21 +16,22 @@
     <p:sldId id="270" r:id="rId10"/>
     <p:sldId id="271" r:id="rId11"/>
     <p:sldId id="272" r:id="rId12"/>
-    <p:sldId id="273" r:id="rId13"/>
-    <p:sldId id="274" r:id="rId14"/>
-    <p:sldId id="281" r:id="rId15"/>
-    <p:sldId id="282" r:id="rId16"/>
-    <p:sldId id="276" r:id="rId17"/>
-    <p:sldId id="283" r:id="rId18"/>
-    <p:sldId id="277" r:id="rId19"/>
-    <p:sldId id="278" r:id="rId20"/>
-    <p:sldId id="279" r:id="rId21"/>
-    <p:sldId id="280" r:id="rId22"/>
-    <p:sldId id="284" r:id="rId23"/>
-    <p:sldId id="285" r:id="rId24"/>
-    <p:sldId id="286" r:id="rId25"/>
-    <p:sldId id="288" r:id="rId26"/>
-    <p:sldId id="289" r:id="rId27"/>
+    <p:sldId id="290" r:id="rId13"/>
+    <p:sldId id="273" r:id="rId14"/>
+    <p:sldId id="274" r:id="rId15"/>
+    <p:sldId id="281" r:id="rId16"/>
+    <p:sldId id="282" r:id="rId17"/>
+    <p:sldId id="276" r:id="rId18"/>
+    <p:sldId id="283" r:id="rId19"/>
+    <p:sldId id="277" r:id="rId20"/>
+    <p:sldId id="278" r:id="rId21"/>
+    <p:sldId id="279" r:id="rId22"/>
+    <p:sldId id="280" r:id="rId23"/>
+    <p:sldId id="284" r:id="rId24"/>
+    <p:sldId id="285" r:id="rId25"/>
+    <p:sldId id="286" r:id="rId26"/>
+    <p:sldId id="288" r:id="rId27"/>
+    <p:sldId id="289" r:id="rId28"/>
   </p:sldIdLst>
   <p:sldSz cx="9525000" cy="9525000"/>
   <p:notesSz cx="6858000" cy="9144000"/>
@@ -3848,6 +3849,120 @@
       </p:grpSpPr>
       <p:sp>
         <p:nvSpPr>
+          <p:cNvPr id="7" name="Ellipse 6"/>
+          <p:cNvSpPr/>
+          <p:nvPr/>
+        </p:nvSpPr>
+        <p:spPr>
+          <a:xfrm>
+            <a:off x="793663" y="793662"/>
+            <a:ext cx="7937675" cy="7937675"/>
+          </a:xfrm>
+          <a:prstGeom prst="ellipse">
+            <a:avLst/>
+          </a:prstGeom>
+          <a:solidFill>
+            <a:srgbClr val="0070C0"/>
+          </a:solidFill>
+          <a:ln>
+            <a:noFill/>
+          </a:ln>
+        </p:spPr>
+        <p:style>
+          <a:lnRef idx="2">
+            <a:schemeClr val="accent1">
+              <a:shade val="50000"/>
+            </a:schemeClr>
+          </a:lnRef>
+          <a:fillRef idx="1">
+            <a:schemeClr val="accent1"/>
+          </a:fillRef>
+          <a:effectRef idx="0">
+            <a:schemeClr val="accent1"/>
+          </a:effectRef>
+          <a:fontRef idx="minor">
+            <a:schemeClr val="lt1"/>
+          </a:fontRef>
+        </p:style>
+        <p:txBody>
+          <a:bodyPr rtlCol="0" anchor="ctr"/>
+          <a:lstStyle/>
+          <a:p>
+            <a:pPr algn="ctr"/>
+            <a:endParaRPr lang="de-DE" sz="12172" b="1" dirty="0"/>
+          </a:p>
+        </p:txBody>
+      </p:sp>
+      <p:sp>
+        <p:nvSpPr>
+          <p:cNvPr id="3" name="Textfeld 2"/>
+          <p:cNvSpPr txBox="1"/>
+          <p:nvPr/>
+        </p:nvSpPr>
+        <p:spPr>
+          <a:xfrm>
+            <a:off x="2902055" y="138157"/>
+            <a:ext cx="3720890" cy="9248686"/>
+          </a:xfrm>
+          <a:prstGeom prst="rect">
+            <a:avLst/>
+          </a:prstGeom>
+          <a:noFill/>
+        </p:spPr>
+        <p:txBody>
+          <a:bodyPr wrap="none" rtlCol="0">
+            <a:spAutoFit/>
+          </a:bodyPr>
+          <a:lstStyle/>
+          <a:p>
+            <a:r>
+              <a:rPr lang="de-DE" sz="59500" b="1" dirty="0" smtClean="0">
+                <a:solidFill>
+                  <a:schemeClr val="bg1"/>
+                </a:solidFill>
+              </a:rPr>
+              <a:t>?</a:t>
+            </a:r>
+            <a:endParaRPr lang="de-DE" sz="59500" b="1" dirty="0">
+              <a:solidFill>
+                <a:schemeClr val="bg1"/>
+              </a:solidFill>
+            </a:endParaRPr>
+          </a:p>
+        </p:txBody>
+      </p:sp>
+    </p:spTree>
+    <p:extLst>
+      <p:ext uri="{BB962C8B-B14F-4D97-AF65-F5344CB8AC3E}">
+        <p14:creationId xmlns:p14="http://schemas.microsoft.com/office/powerpoint/2010/main" val="3327584539"/>
+      </p:ext>
+    </p:extLst>
+  </p:cSld>
+  <p:clrMapOvr>
+    <a:masterClrMapping/>
+  </p:clrMapOvr>
+</p:sld>
+</file>
+
+<file path=ppt/slides/slide13.xml><?xml version="1.0" encoding="utf-8"?>
+<p:sld xmlns:a="http://schemas.openxmlformats.org/drawingml/2006/main" xmlns:r="http://schemas.openxmlformats.org/officeDocument/2006/relationships" xmlns:p="http://schemas.openxmlformats.org/presentationml/2006/main" showMasterSp="0">
+  <p:cSld>
+    <p:spTree>
+      <p:nvGrpSpPr>
+        <p:cNvPr id="1" name=""/>
+        <p:cNvGrpSpPr/>
+        <p:nvPr/>
+      </p:nvGrpSpPr>
+      <p:grpSpPr>
+        <a:xfrm>
+          <a:off x="0" y="0"/>
+          <a:ext cx="0" cy="0"/>
+          <a:chOff x="0" y="0"/>
+          <a:chExt cx="0" cy="0"/>
+        </a:xfrm>
+      </p:grpSpPr>
+      <p:sp>
+        <p:nvSpPr>
           <p:cNvPr id="2" name="Ellipse 1"/>
           <p:cNvSpPr/>
           <p:nvPr/>
@@ -3961,7 +4076,7 @@
 </p:sld>
 </file>
 
-<file path=ppt/slides/slide13.xml><?xml version="1.0" encoding="utf-8"?>
+<file path=ppt/slides/slide14.xml><?xml version="1.0" encoding="utf-8"?>
 <p:sld xmlns:a="http://schemas.openxmlformats.org/drawingml/2006/main" xmlns:r="http://schemas.openxmlformats.org/officeDocument/2006/relationships" xmlns:p="http://schemas.openxmlformats.org/presentationml/2006/main" showMasterSp="0">
   <p:cSld>
     <p:spTree>
@@ -4561,7 +4676,7 @@
 </p:sld>
 </file>
 
-<file path=ppt/slides/slide14.xml><?xml version="1.0" encoding="utf-8"?>
+<file path=ppt/slides/slide15.xml><?xml version="1.0" encoding="utf-8"?>
 <p:sld xmlns:a="http://schemas.openxmlformats.org/drawingml/2006/main" xmlns:r="http://schemas.openxmlformats.org/officeDocument/2006/relationships" xmlns:p="http://schemas.openxmlformats.org/presentationml/2006/main" showMasterSp="0">
   <p:cSld>
     <p:spTree>
@@ -5277,7 +5392,7 @@
 </p:sld>
 </file>
 
-<file path=ppt/slides/slide15.xml><?xml version="1.0" encoding="utf-8"?>
+<file path=ppt/slides/slide16.xml><?xml version="1.0" encoding="utf-8"?>
 <p:sld xmlns:a="http://schemas.openxmlformats.org/drawingml/2006/main" xmlns:r="http://schemas.openxmlformats.org/officeDocument/2006/relationships" xmlns:p="http://schemas.openxmlformats.org/presentationml/2006/main" showMasterSp="0">
   <p:cSld>
     <p:spTree>
@@ -6060,7 +6175,7 @@
 </p:sld>
 </file>
 
-<file path=ppt/slides/slide16.xml><?xml version="1.0" encoding="utf-8"?>
+<file path=ppt/slides/slide17.xml><?xml version="1.0" encoding="utf-8"?>
 <p:sld xmlns:a="http://schemas.openxmlformats.org/drawingml/2006/main" xmlns:r="http://schemas.openxmlformats.org/officeDocument/2006/relationships" xmlns:p="http://schemas.openxmlformats.org/presentationml/2006/main" showMasterSp="0">
   <p:cSld>
     <p:spTree>
@@ -6434,7 +6549,7 @@
 </p:sld>
 </file>
 
-<file path=ppt/slides/slide17.xml><?xml version="1.0" encoding="utf-8"?>
+<file path=ppt/slides/slide18.xml><?xml version="1.0" encoding="utf-8"?>
 <p:sld xmlns:a="http://schemas.openxmlformats.org/drawingml/2006/main" xmlns:r="http://schemas.openxmlformats.org/officeDocument/2006/relationships" xmlns:p="http://schemas.openxmlformats.org/presentationml/2006/main" showMasterSp="0">
   <p:cSld>
     <p:spTree>
@@ -6662,7 +6777,7 @@
 </p:sld>
 </file>
 
-<file path=ppt/slides/slide18.xml><?xml version="1.0" encoding="utf-8"?>
+<file path=ppt/slides/slide19.xml><?xml version="1.0" encoding="utf-8"?>
 <p:sld xmlns:a="http://schemas.openxmlformats.org/drawingml/2006/main" xmlns:r="http://schemas.openxmlformats.org/officeDocument/2006/relationships" xmlns:p="http://schemas.openxmlformats.org/presentationml/2006/main" showMasterSp="0">
   <p:cSld>
     <p:spTree>
@@ -6838,7 +6953,203 @@
 </p:sld>
 </file>
 
-<file path=ppt/slides/slide19.xml><?xml version="1.0" encoding="utf-8"?>
+<file path=ppt/slides/slide2.xml><?xml version="1.0" encoding="utf-8"?>
+<p:sld xmlns:a="http://schemas.openxmlformats.org/drawingml/2006/main" xmlns:r="http://schemas.openxmlformats.org/officeDocument/2006/relationships" xmlns:p="http://schemas.openxmlformats.org/presentationml/2006/main" showMasterSp="0">
+  <p:cSld>
+    <p:spTree>
+      <p:nvGrpSpPr>
+        <p:cNvPr id="1" name=""/>
+        <p:cNvGrpSpPr/>
+        <p:nvPr/>
+      </p:nvGrpSpPr>
+      <p:grpSpPr>
+        <a:xfrm>
+          <a:off x="0" y="0"/>
+          <a:ext cx="0" cy="0"/>
+          <a:chOff x="0" y="0"/>
+          <a:chExt cx="0" cy="0"/>
+        </a:xfrm>
+      </p:grpSpPr>
+      <p:sp>
+        <p:nvSpPr>
+          <p:cNvPr id="2" name="Gleichschenkliges Dreieck 1"/>
+          <p:cNvSpPr>
+            <a:spLocks noChangeAspect="1"/>
+          </p:cNvSpPr>
+          <p:nvPr/>
+        </p:nvSpPr>
+        <p:spPr>
+          <a:xfrm rot="5400000">
+            <a:off x="926502" y="929794"/>
+            <a:ext cx="4372854" cy="4345499"/>
+          </a:xfrm>
+          <a:prstGeom prst="triangle">
+            <a:avLst/>
+          </a:prstGeom>
+          <a:ln>
+            <a:noFill/>
+          </a:ln>
+        </p:spPr>
+        <p:style>
+          <a:lnRef idx="3">
+            <a:schemeClr val="lt1"/>
+          </a:lnRef>
+          <a:fillRef idx="1">
+            <a:schemeClr val="accent5"/>
+          </a:fillRef>
+          <a:effectRef idx="1">
+            <a:schemeClr val="accent5"/>
+          </a:effectRef>
+          <a:fontRef idx="minor">
+            <a:schemeClr val="lt1"/>
+          </a:fontRef>
+        </p:style>
+        <p:txBody>
+          <a:bodyPr rtlCol="0" anchor="ctr"/>
+          <a:lstStyle/>
+          <a:p>
+            <a:pPr algn="ctr"/>
+            <a:endParaRPr lang="de-DE"/>
+          </a:p>
+        </p:txBody>
+      </p:sp>
+      <p:sp>
+        <p:nvSpPr>
+          <p:cNvPr id="4" name="Rechteck 3"/>
+          <p:cNvSpPr/>
+          <p:nvPr/>
+        </p:nvSpPr>
+        <p:spPr>
+          <a:xfrm>
+            <a:off x="1304692" y="7103327"/>
+            <a:ext cx="7181385" cy="1081668"/>
+          </a:xfrm>
+          <a:prstGeom prst="rect">
+            <a:avLst/>
+          </a:prstGeom>
+          <a:ln>
+            <a:noFill/>
+          </a:ln>
+        </p:spPr>
+        <p:style>
+          <a:lnRef idx="3">
+            <a:schemeClr val="lt1"/>
+          </a:lnRef>
+          <a:fillRef idx="1">
+            <a:schemeClr val="accent5"/>
+          </a:fillRef>
+          <a:effectRef idx="1">
+            <a:schemeClr val="accent5"/>
+          </a:effectRef>
+          <a:fontRef idx="minor">
+            <a:schemeClr val="lt1"/>
+          </a:fontRef>
+        </p:style>
+        <p:txBody>
+          <a:bodyPr rtlCol="0" anchor="ctr"/>
+          <a:lstStyle/>
+          <a:p>
+            <a:pPr algn="ctr"/>
+            <a:endParaRPr lang="de-DE"/>
+          </a:p>
+        </p:txBody>
+      </p:sp>
+      <p:sp>
+        <p:nvSpPr>
+          <p:cNvPr id="5" name="Rechteck 4"/>
+          <p:cNvSpPr/>
+          <p:nvPr/>
+        </p:nvSpPr>
+        <p:spPr>
+          <a:xfrm>
+            <a:off x="2509024" y="5371171"/>
+            <a:ext cx="5977052" cy="1081668"/>
+          </a:xfrm>
+          <a:prstGeom prst="rect">
+            <a:avLst/>
+          </a:prstGeom>
+          <a:ln>
+            <a:noFill/>
+          </a:ln>
+        </p:spPr>
+        <p:style>
+          <a:lnRef idx="3">
+            <a:schemeClr val="lt1"/>
+          </a:lnRef>
+          <a:fillRef idx="1">
+            <a:schemeClr val="accent5"/>
+          </a:fillRef>
+          <a:effectRef idx="1">
+            <a:schemeClr val="accent5"/>
+          </a:effectRef>
+          <a:fontRef idx="minor">
+            <a:schemeClr val="lt1"/>
+          </a:fontRef>
+        </p:style>
+        <p:txBody>
+          <a:bodyPr rtlCol="0" anchor="ctr"/>
+          <a:lstStyle/>
+          <a:p>
+            <a:pPr algn="ctr"/>
+            <a:endParaRPr lang="de-DE"/>
+          </a:p>
+        </p:txBody>
+      </p:sp>
+      <p:sp>
+        <p:nvSpPr>
+          <p:cNvPr id="6" name="Rechteck 5"/>
+          <p:cNvSpPr/>
+          <p:nvPr/>
+        </p:nvSpPr>
+        <p:spPr>
+          <a:xfrm>
+            <a:off x="4762500" y="3707569"/>
+            <a:ext cx="3723575" cy="1081668"/>
+          </a:xfrm>
+          <a:prstGeom prst="rect">
+            <a:avLst/>
+          </a:prstGeom>
+          <a:ln>
+            <a:noFill/>
+          </a:ln>
+        </p:spPr>
+        <p:style>
+          <a:lnRef idx="3">
+            <a:schemeClr val="lt1"/>
+          </a:lnRef>
+          <a:fillRef idx="1">
+            <a:schemeClr val="accent5"/>
+          </a:fillRef>
+          <a:effectRef idx="1">
+            <a:schemeClr val="accent5"/>
+          </a:effectRef>
+          <a:fontRef idx="minor">
+            <a:schemeClr val="lt1"/>
+          </a:fontRef>
+        </p:style>
+        <p:txBody>
+          <a:bodyPr rtlCol="0" anchor="ctr"/>
+          <a:lstStyle/>
+          <a:p>
+            <a:pPr algn="ctr"/>
+            <a:endParaRPr lang="de-DE"/>
+          </a:p>
+        </p:txBody>
+      </p:sp>
+    </p:spTree>
+    <p:extLst>
+      <p:ext uri="{BB962C8B-B14F-4D97-AF65-F5344CB8AC3E}">
+        <p14:creationId xmlns:p14="http://schemas.microsoft.com/office/powerpoint/2010/main" val="3820475310"/>
+      </p:ext>
+    </p:extLst>
+  </p:cSld>
+  <p:clrMapOvr>
+    <a:masterClrMapping/>
+  </p:clrMapOvr>
+</p:sld>
+</file>
+
+<file path=ppt/slides/slide20.xml><?xml version="1.0" encoding="utf-8"?>
 <p:sld xmlns:a="http://schemas.openxmlformats.org/drawingml/2006/main" xmlns:r="http://schemas.openxmlformats.org/officeDocument/2006/relationships" xmlns:p="http://schemas.openxmlformats.org/presentationml/2006/main" showMasterSp="0">
   <p:cSld>
     <p:spTree>
@@ -7009,7 +7320,7 @@
 </p:sld>
 </file>
 
-<file path=ppt/slides/slide2.xml><?xml version="1.0" encoding="utf-8"?>
+<file path=ppt/slides/slide21.xml><?xml version="1.0" encoding="utf-8"?>
 <p:sld xmlns:a="http://schemas.openxmlformats.org/drawingml/2006/main" xmlns:r="http://schemas.openxmlformats.org/officeDocument/2006/relationships" xmlns:p="http://schemas.openxmlformats.org/presentationml/2006/main" showMasterSp="0">
   <p:cSld>
     <p:spTree>
@@ -7028,202 +7339,6 @@
       </p:grpSpPr>
       <p:sp>
         <p:nvSpPr>
-          <p:cNvPr id="2" name="Gleichschenkliges Dreieck 1"/>
-          <p:cNvSpPr>
-            <a:spLocks noChangeAspect="1"/>
-          </p:cNvSpPr>
-          <p:nvPr/>
-        </p:nvSpPr>
-        <p:spPr>
-          <a:xfrm rot="5400000">
-            <a:off x="926502" y="929794"/>
-            <a:ext cx="4372854" cy="4345499"/>
-          </a:xfrm>
-          <a:prstGeom prst="triangle">
-            <a:avLst/>
-          </a:prstGeom>
-          <a:ln>
-            <a:noFill/>
-          </a:ln>
-        </p:spPr>
-        <p:style>
-          <a:lnRef idx="3">
-            <a:schemeClr val="lt1"/>
-          </a:lnRef>
-          <a:fillRef idx="1">
-            <a:schemeClr val="accent5"/>
-          </a:fillRef>
-          <a:effectRef idx="1">
-            <a:schemeClr val="accent5"/>
-          </a:effectRef>
-          <a:fontRef idx="minor">
-            <a:schemeClr val="lt1"/>
-          </a:fontRef>
-        </p:style>
-        <p:txBody>
-          <a:bodyPr rtlCol="0" anchor="ctr"/>
-          <a:lstStyle/>
-          <a:p>
-            <a:pPr algn="ctr"/>
-            <a:endParaRPr lang="de-DE"/>
-          </a:p>
-        </p:txBody>
-      </p:sp>
-      <p:sp>
-        <p:nvSpPr>
-          <p:cNvPr id="4" name="Rechteck 3"/>
-          <p:cNvSpPr/>
-          <p:nvPr/>
-        </p:nvSpPr>
-        <p:spPr>
-          <a:xfrm>
-            <a:off x="1304692" y="7103327"/>
-            <a:ext cx="7181385" cy="1081668"/>
-          </a:xfrm>
-          <a:prstGeom prst="rect">
-            <a:avLst/>
-          </a:prstGeom>
-          <a:ln>
-            <a:noFill/>
-          </a:ln>
-        </p:spPr>
-        <p:style>
-          <a:lnRef idx="3">
-            <a:schemeClr val="lt1"/>
-          </a:lnRef>
-          <a:fillRef idx="1">
-            <a:schemeClr val="accent5"/>
-          </a:fillRef>
-          <a:effectRef idx="1">
-            <a:schemeClr val="accent5"/>
-          </a:effectRef>
-          <a:fontRef idx="minor">
-            <a:schemeClr val="lt1"/>
-          </a:fontRef>
-        </p:style>
-        <p:txBody>
-          <a:bodyPr rtlCol="0" anchor="ctr"/>
-          <a:lstStyle/>
-          <a:p>
-            <a:pPr algn="ctr"/>
-            <a:endParaRPr lang="de-DE"/>
-          </a:p>
-        </p:txBody>
-      </p:sp>
-      <p:sp>
-        <p:nvSpPr>
-          <p:cNvPr id="5" name="Rechteck 4"/>
-          <p:cNvSpPr/>
-          <p:nvPr/>
-        </p:nvSpPr>
-        <p:spPr>
-          <a:xfrm>
-            <a:off x="2509024" y="5371171"/>
-            <a:ext cx="5977052" cy="1081668"/>
-          </a:xfrm>
-          <a:prstGeom prst="rect">
-            <a:avLst/>
-          </a:prstGeom>
-          <a:ln>
-            <a:noFill/>
-          </a:ln>
-        </p:spPr>
-        <p:style>
-          <a:lnRef idx="3">
-            <a:schemeClr val="lt1"/>
-          </a:lnRef>
-          <a:fillRef idx="1">
-            <a:schemeClr val="accent5"/>
-          </a:fillRef>
-          <a:effectRef idx="1">
-            <a:schemeClr val="accent5"/>
-          </a:effectRef>
-          <a:fontRef idx="minor">
-            <a:schemeClr val="lt1"/>
-          </a:fontRef>
-        </p:style>
-        <p:txBody>
-          <a:bodyPr rtlCol="0" anchor="ctr"/>
-          <a:lstStyle/>
-          <a:p>
-            <a:pPr algn="ctr"/>
-            <a:endParaRPr lang="de-DE"/>
-          </a:p>
-        </p:txBody>
-      </p:sp>
-      <p:sp>
-        <p:nvSpPr>
-          <p:cNvPr id="6" name="Rechteck 5"/>
-          <p:cNvSpPr/>
-          <p:nvPr/>
-        </p:nvSpPr>
-        <p:spPr>
-          <a:xfrm>
-            <a:off x="4762500" y="3707569"/>
-            <a:ext cx="3723575" cy="1081668"/>
-          </a:xfrm>
-          <a:prstGeom prst="rect">
-            <a:avLst/>
-          </a:prstGeom>
-          <a:ln>
-            <a:noFill/>
-          </a:ln>
-        </p:spPr>
-        <p:style>
-          <a:lnRef idx="3">
-            <a:schemeClr val="lt1"/>
-          </a:lnRef>
-          <a:fillRef idx="1">
-            <a:schemeClr val="accent5"/>
-          </a:fillRef>
-          <a:effectRef idx="1">
-            <a:schemeClr val="accent5"/>
-          </a:effectRef>
-          <a:fontRef idx="minor">
-            <a:schemeClr val="lt1"/>
-          </a:fontRef>
-        </p:style>
-        <p:txBody>
-          <a:bodyPr rtlCol="0" anchor="ctr"/>
-          <a:lstStyle/>
-          <a:p>
-            <a:pPr algn="ctr"/>
-            <a:endParaRPr lang="de-DE"/>
-          </a:p>
-        </p:txBody>
-      </p:sp>
-    </p:spTree>
-    <p:extLst>
-      <p:ext uri="{BB962C8B-B14F-4D97-AF65-F5344CB8AC3E}">
-        <p14:creationId xmlns:p14="http://schemas.microsoft.com/office/powerpoint/2010/main" val="3820475310"/>
-      </p:ext>
-    </p:extLst>
-  </p:cSld>
-  <p:clrMapOvr>
-    <a:masterClrMapping/>
-  </p:clrMapOvr>
-</p:sld>
-</file>
-
-<file path=ppt/slides/slide20.xml><?xml version="1.0" encoding="utf-8"?>
-<p:sld xmlns:a="http://schemas.openxmlformats.org/drawingml/2006/main" xmlns:r="http://schemas.openxmlformats.org/officeDocument/2006/relationships" xmlns:p="http://schemas.openxmlformats.org/presentationml/2006/main" showMasterSp="0">
-  <p:cSld>
-    <p:spTree>
-      <p:nvGrpSpPr>
-        <p:cNvPr id="1" name=""/>
-        <p:cNvGrpSpPr/>
-        <p:nvPr/>
-      </p:nvGrpSpPr>
-      <p:grpSpPr>
-        <a:xfrm>
-          <a:off x="0" y="0"/>
-          <a:ext cx="0" cy="0"/>
-          <a:chOff x="0" y="0"/>
-          <a:chExt cx="0" cy="0"/>
-        </a:xfrm>
-      </p:grpSpPr>
-      <p:sp>
-        <p:nvSpPr>
           <p:cNvPr id="4" name="Rechteck 3"/>
           <p:cNvSpPr/>
           <p:nvPr/>
@@ -7373,7 +7488,7 @@
 </p:sld>
 </file>
 
-<file path=ppt/slides/slide21.xml><?xml version="1.0" encoding="utf-8"?>
+<file path=ppt/slides/slide22.xml><?xml version="1.0" encoding="utf-8"?>
 <p:sld xmlns:a="http://schemas.openxmlformats.org/drawingml/2006/main" xmlns:r="http://schemas.openxmlformats.org/officeDocument/2006/relationships" xmlns:p="http://schemas.openxmlformats.org/presentationml/2006/main" showMasterSp="0">
   <p:cSld>
     <p:spTree>
@@ -8153,7 +8268,7 @@
 </p:sld>
 </file>
 
-<file path=ppt/slides/slide22.xml><?xml version="1.0" encoding="utf-8"?>
+<file path=ppt/slides/slide23.xml><?xml version="1.0" encoding="utf-8"?>
 <p:sld xmlns:a="http://schemas.openxmlformats.org/drawingml/2006/main" xmlns:r="http://schemas.openxmlformats.org/officeDocument/2006/relationships" xmlns:p="http://schemas.openxmlformats.org/presentationml/2006/main">
   <p:cSld>
     <p:spTree>
@@ -8417,7 +8532,7 @@
 </p:sld>
 </file>
 
-<file path=ppt/slides/slide23.xml><?xml version="1.0" encoding="utf-8"?>
+<file path=ppt/slides/slide24.xml><?xml version="1.0" encoding="utf-8"?>
 <p:sld xmlns:a="http://schemas.openxmlformats.org/drawingml/2006/main" xmlns:r="http://schemas.openxmlformats.org/officeDocument/2006/relationships" xmlns:p="http://schemas.openxmlformats.org/presentationml/2006/main" showMasterSp="0">
   <p:cSld>
     <p:spTree>
@@ -8499,7 +8614,7 @@
 </p:sld>
 </file>
 
-<file path=ppt/slides/slide24.xml><?xml version="1.0" encoding="utf-8"?>
+<file path=ppt/slides/slide25.xml><?xml version="1.0" encoding="utf-8"?>
 <p:sld xmlns:a="http://schemas.openxmlformats.org/drawingml/2006/main" xmlns:r="http://schemas.openxmlformats.org/officeDocument/2006/relationships" xmlns:p="http://schemas.openxmlformats.org/presentationml/2006/main" showMasterSp="0">
   <p:cSld>
     <p:spTree>
@@ -8626,7 +8741,7 @@
 </p:sld>
 </file>
 
-<file path=ppt/slides/slide25.xml><?xml version="1.0" encoding="utf-8"?>
+<file path=ppt/slides/slide26.xml><?xml version="1.0" encoding="utf-8"?>
 <p:sld xmlns:a="http://schemas.openxmlformats.org/drawingml/2006/main" xmlns:r="http://schemas.openxmlformats.org/officeDocument/2006/relationships" xmlns:p="http://schemas.openxmlformats.org/presentationml/2006/main" showMasterSp="0">
   <p:cSld>
     <p:spTree>
@@ -8757,7 +8872,7 @@
 </p:sld>
 </file>
 
-<file path=ppt/slides/slide26.xml><?xml version="1.0" encoding="utf-8"?>
+<file path=ppt/slides/slide27.xml><?xml version="1.0" encoding="utf-8"?>
 <p:sld xmlns:a="http://schemas.openxmlformats.org/drawingml/2006/main" xmlns:r="http://schemas.openxmlformats.org/officeDocument/2006/relationships" xmlns:p="http://schemas.openxmlformats.org/presentationml/2006/main" showMasterSp="0">
   <p:cSld>
     <p:spTree>
@@ -9888,7 +10003,9 @@
             </a:pathLst>
           </a:custGeom>
           <a:solidFill>
-            <a:schemeClr val="bg1"/>
+            <a:schemeClr val="bg1">
+              <a:lumMod val="75000"/>
+            </a:schemeClr>
           </a:solidFill>
           <a:ln>
             <a:noFill/>
@@ -10143,7 +10260,9 @@
             </a:pathLst>
           </a:custGeom>
           <a:solidFill>
-            <a:schemeClr val="bg1"/>
+            <a:schemeClr val="bg1">
+              <a:lumMod val="75000"/>
+            </a:schemeClr>
           </a:solidFill>
           <a:ln>
             <a:noFill/>
@@ -10224,22 +10343,32 @@
       </p:sp>
       <p:sp>
         <p:nvSpPr>
-          <p:cNvPr id="16" name="Pfeil: nach oben 15"/>
+          <p:cNvPr id="5" name="Additionszeichen 3"/>
           <p:cNvSpPr/>
           <p:nvPr/>
         </p:nvSpPr>
         <p:spPr>
-          <a:xfrm rot="5400000">
-            <a:off x="4762500" y="5510164"/>
-            <a:ext cx="3612303" cy="3511495"/>
-          </a:xfrm>
-          <a:prstGeom prst="upArrow">
-            <a:avLst/>
+          <a:xfrm>
+            <a:off x="1942995" y="2680503"/>
+            <a:ext cx="7582005" cy="7634336"/>
+          </a:xfrm>
+          <a:prstGeom prst="mathMultiply">
+            <a:avLst>
+              <a:gd name="adj1" fmla="val 20476"/>
+            </a:avLst>
           </a:prstGeom>
           <a:solidFill>
             <a:srgbClr val="FF0000"/>
           </a:solidFill>
+          <a:ln>
+            <a:noFill/>
+          </a:ln>
           <a:effectLst/>
+          <a:scene3d>
+            <a:camera prst="orthographicFront"/>
+            <a:lightRig rig="threePt" dir="t"/>
+          </a:scene3d>
+          <a:sp3d extrusionH="1270000"/>
         </p:spPr>
         <p:style>
           <a:lnRef idx="0">

</xml_diff>